<commit_message>
correct typos in midterm review
</commit_message>
<xml_diff>
--- a/files/exam_review24/midterm/midterm_concept_review.pptx
+++ b/files/exam_review24/midterm/midterm_concept_review.pptx
@@ -3457,10 +3457,10 @@
       </p:sp>
       <p:pic>
         <p:nvPicPr>
-          <p:cNvPr id="8" name="Picture 7">
-            <a:extLst>
-              <a:ext uri="{FF2B5EF4-FFF2-40B4-BE49-F238E27FC236}">
-                <a16:creationId xmlns:a16="http://schemas.microsoft.com/office/drawing/2014/main" id="{9F5897E0-C713-28A6-2452-46DCA739A023}"/>
+          <p:cNvPr id="10" name="Picture 9" descr="A grid with numbers and letters&#10;&#10;Description automatically generated">
+            <a:extLst>
+              <a:ext uri="{FF2B5EF4-FFF2-40B4-BE49-F238E27FC236}">
+                <a16:creationId xmlns:a16="http://schemas.microsoft.com/office/drawing/2014/main" id="{1DF06027-4017-BB64-35CB-1823EAD0837C}"/>
               </a:ext>
             </a:extLst>
           </p:cNvPr>
@@ -3471,13 +3471,13 @@
         </p:nvPicPr>
         <p:blipFill rotWithShape="1">
           <a:blip r:embed="rId3"/>
-          <a:srcRect l="20345" r="19587"/>
+          <a:srcRect r="18165" b="6993"/>
           <a:stretch/>
         </p:blipFill>
         <p:spPr>
           <a:xfrm>
-            <a:off x="2884031" y="5059712"/>
-            <a:ext cx="4668734" cy="607974"/>
+            <a:off x="5398444" y="2164838"/>
+            <a:ext cx="2858090" cy="2929353"/>
           </a:xfrm>
           <a:prstGeom prst="rect">
             <a:avLst/>
@@ -3486,10 +3486,10 @@
       </p:pic>
       <p:pic>
         <p:nvPicPr>
-          <p:cNvPr id="10" name="Picture 9" descr="A grid with numbers and letters&#10;&#10;Description automatically generated">
-            <a:extLst>
-              <a:ext uri="{FF2B5EF4-FFF2-40B4-BE49-F238E27FC236}">
-                <a16:creationId xmlns:a16="http://schemas.microsoft.com/office/drawing/2014/main" id="{1DF06027-4017-BB64-35CB-1823EAD0837C}"/>
+          <p:cNvPr id="5" name="Picture 4">
+            <a:extLst>
+              <a:ext uri="{FF2B5EF4-FFF2-40B4-BE49-F238E27FC236}">
+                <a16:creationId xmlns:a16="http://schemas.microsoft.com/office/drawing/2014/main" id="{75D46B3F-53A8-1B83-F356-95855E7E5EFC}"/>
               </a:ext>
             </a:extLst>
           </p:cNvPr>
@@ -3500,13 +3500,13 @@
         </p:nvPicPr>
         <p:blipFill rotWithShape="1">
           <a:blip r:embed="rId4"/>
-          <a:srcRect r="18165" b="6993"/>
+          <a:srcRect l="22858" t="20490" r="22750" b="20490"/>
           <a:stretch/>
         </p:blipFill>
         <p:spPr>
           <a:xfrm>
-            <a:off x="5398444" y="2164838"/>
-            <a:ext cx="2858090" cy="2929353"/>
+            <a:off x="2884031" y="5198280"/>
+            <a:ext cx="4227615" cy="369333"/>
           </a:xfrm>
           <a:prstGeom prst="rect">
             <a:avLst/>
@@ -7053,7 +7053,7 @@
         <p:spPr>
           <a:xfrm>
             <a:off x="6043237" y="1692773"/>
-            <a:ext cx="2670924" cy="400110"/>
+            <a:ext cx="2481770" cy="400110"/>
           </a:xfrm>
           <a:prstGeom prst="rect">
             <a:avLst/>
@@ -7074,7 +7074,7 @@
                 <a:latin typeface="Lucida Grande"/>
                 <a:cs typeface="Lucida Grande"/>
               </a:rPr>
-              <a:t>This is a NAND gate</a:t>
+              <a:t>This is a AND gate</a:t>
             </a:r>
           </a:p>
         </p:txBody>

</xml_diff>

<commit_message>
Deploy www.eecs151.org to github.com/EECS150/eecs150.github.io.git:gh-pages
</commit_message>
<xml_diff>
--- a/files/exam_review24/midterm/midterm_concept_review.pptx
+++ b/files/exam_review24/midterm/midterm_concept_review.pptx
@@ -3457,10 +3457,10 @@
       </p:sp>
       <p:pic>
         <p:nvPicPr>
-          <p:cNvPr id="8" name="Picture 7">
-            <a:extLst>
-              <a:ext uri="{FF2B5EF4-FFF2-40B4-BE49-F238E27FC236}">
-                <a16:creationId xmlns:a16="http://schemas.microsoft.com/office/drawing/2014/main" id="{9F5897E0-C713-28A6-2452-46DCA739A023}"/>
+          <p:cNvPr id="10" name="Picture 9" descr="A grid with numbers and letters&#10;&#10;Description automatically generated">
+            <a:extLst>
+              <a:ext uri="{FF2B5EF4-FFF2-40B4-BE49-F238E27FC236}">
+                <a16:creationId xmlns:a16="http://schemas.microsoft.com/office/drawing/2014/main" id="{1DF06027-4017-BB64-35CB-1823EAD0837C}"/>
               </a:ext>
             </a:extLst>
           </p:cNvPr>
@@ -3471,13 +3471,13 @@
         </p:nvPicPr>
         <p:blipFill rotWithShape="1">
           <a:blip r:embed="rId3"/>
-          <a:srcRect l="20345" r="19587"/>
+          <a:srcRect r="18165" b="6993"/>
           <a:stretch/>
         </p:blipFill>
         <p:spPr>
           <a:xfrm>
-            <a:off x="2884031" y="5059712"/>
-            <a:ext cx="4668734" cy="607974"/>
+            <a:off x="5398444" y="2164838"/>
+            <a:ext cx="2858090" cy="2929353"/>
           </a:xfrm>
           <a:prstGeom prst="rect">
             <a:avLst/>
@@ -3486,10 +3486,10 @@
       </p:pic>
       <p:pic>
         <p:nvPicPr>
-          <p:cNvPr id="10" name="Picture 9" descr="A grid with numbers and letters&#10;&#10;Description automatically generated">
-            <a:extLst>
-              <a:ext uri="{FF2B5EF4-FFF2-40B4-BE49-F238E27FC236}">
-                <a16:creationId xmlns:a16="http://schemas.microsoft.com/office/drawing/2014/main" id="{1DF06027-4017-BB64-35CB-1823EAD0837C}"/>
+          <p:cNvPr id="5" name="Picture 4">
+            <a:extLst>
+              <a:ext uri="{FF2B5EF4-FFF2-40B4-BE49-F238E27FC236}">
+                <a16:creationId xmlns:a16="http://schemas.microsoft.com/office/drawing/2014/main" id="{75D46B3F-53A8-1B83-F356-95855E7E5EFC}"/>
               </a:ext>
             </a:extLst>
           </p:cNvPr>
@@ -3500,13 +3500,13 @@
         </p:nvPicPr>
         <p:blipFill rotWithShape="1">
           <a:blip r:embed="rId4"/>
-          <a:srcRect r="18165" b="6993"/>
+          <a:srcRect l="22858" t="20490" r="22750" b="20490"/>
           <a:stretch/>
         </p:blipFill>
         <p:spPr>
           <a:xfrm>
-            <a:off x="5398444" y="2164838"/>
-            <a:ext cx="2858090" cy="2929353"/>
+            <a:off x="2884031" y="5198280"/>
+            <a:ext cx="4227615" cy="369333"/>
           </a:xfrm>
           <a:prstGeom prst="rect">
             <a:avLst/>
@@ -7053,7 +7053,7 @@
         <p:spPr>
           <a:xfrm>
             <a:off x="6043237" y="1692773"/>
-            <a:ext cx="2670924" cy="400110"/>
+            <a:ext cx="2481770" cy="400110"/>
           </a:xfrm>
           <a:prstGeom prst="rect">
             <a:avLst/>
@@ -7074,7 +7074,7 @@
                 <a:latin typeface="Lucida Grande"/>
                 <a:cs typeface="Lucida Grande"/>
               </a:rPr>
-              <a:t>This is a NAND gate</a:t>
+              <a:t>This is a AND gate</a:t>
             </a:r>
           </a:p>
         </p:txBody>

</xml_diff>

<commit_message>
correct midterm review slides
</commit_message>
<xml_diff>
--- a/files/exam_review24/midterm/midterm_concept_review.pptx
+++ b/files/exam_review24/midterm/midterm_concept_review.pptx
@@ -270,7 +270,7 @@
           <a:p>
             <a:fld id="{97CB1905-1EEB-6545-B5E2-B70E8868255E}" type="datetimeFigureOut">
               <a:rPr lang="en-US" smtClean="0"/>
-              <a:t>3/8/24</a:t>
+              <a:t>3/11/24</a:t>
             </a:fld>
             <a:endParaRPr lang="en-US"/>
           </a:p>
@@ -436,7 +436,7 @@
           <a:p>
             <a:fld id="{5F53F6BF-7462-9046-A2B6-90C29244BD27}" type="datetimeFigureOut">
               <a:rPr lang="en-US" smtClean="0"/>
-              <a:t>3/8/24</a:t>
+              <a:t>3/11/24</a:t>
             </a:fld>
             <a:endParaRPr lang="en-US"/>
           </a:p>
@@ -4492,10 +4492,10 @@
       </p:sp>
       <p:pic>
         <p:nvPicPr>
-          <p:cNvPr id="11" name="Picture 10" descr="A diagram of a diagram&#10;&#10;Description automatically generated">
-            <a:extLst>
-              <a:ext uri="{FF2B5EF4-FFF2-40B4-BE49-F238E27FC236}">
-                <a16:creationId xmlns:a16="http://schemas.microsoft.com/office/drawing/2014/main" id="{6C8D1059-9DF4-49CD-D0C2-844785D96EA6}"/>
+          <p:cNvPr id="13" name="Picture 12" descr="A grid of numbers and symbols&#10;&#10;Description automatically generated">
+            <a:extLst>
+              <a:ext uri="{FF2B5EF4-FFF2-40B4-BE49-F238E27FC236}">
+                <a16:creationId xmlns:a16="http://schemas.microsoft.com/office/drawing/2014/main" id="{16F93BD3-F336-318A-0468-958FF1EEC526}"/>
               </a:ext>
             </a:extLst>
           </p:cNvPr>
@@ -4512,8 +4512,8 @@
         </p:blipFill>
         <p:spPr>
           <a:xfrm>
-            <a:off x="838497" y="1968263"/>
-            <a:ext cx="997717" cy="3480037"/>
+            <a:off x="2336805" y="2425311"/>
+            <a:ext cx="1315107" cy="2546714"/>
           </a:xfrm>
           <a:prstGeom prst="rect">
             <a:avLst/>
@@ -4522,10 +4522,10 @@
       </p:pic>
       <p:pic>
         <p:nvPicPr>
-          <p:cNvPr id="13" name="Picture 12" descr="A grid of numbers and symbols&#10;&#10;Description automatically generated">
-            <a:extLst>
-              <a:ext uri="{FF2B5EF4-FFF2-40B4-BE49-F238E27FC236}">
-                <a16:creationId xmlns:a16="http://schemas.microsoft.com/office/drawing/2014/main" id="{16F93BD3-F336-318A-0468-958FF1EEC526}"/>
+          <p:cNvPr id="15" name="Picture 14" descr="A diagram of a circuit&#10;&#10;Description automatically generated">
+            <a:extLst>
+              <a:ext uri="{FF2B5EF4-FFF2-40B4-BE49-F238E27FC236}">
+                <a16:creationId xmlns:a16="http://schemas.microsoft.com/office/drawing/2014/main" id="{860A57B3-B306-0B78-14A0-51F94EAA76D8}"/>
               </a:ext>
             </a:extLst>
           </p:cNvPr>
@@ -4542,8 +4542,8 @@
         </p:blipFill>
         <p:spPr>
           <a:xfrm>
-            <a:off x="2336805" y="2425311"/>
-            <a:ext cx="1315107" cy="2546714"/>
+            <a:off x="4052353" y="4595934"/>
+            <a:ext cx="1252868" cy="989584"/>
           </a:xfrm>
           <a:prstGeom prst="rect">
             <a:avLst/>
@@ -4552,10 +4552,10 @@
       </p:pic>
       <p:pic>
         <p:nvPicPr>
-          <p:cNvPr id="15" name="Picture 14" descr="A diagram of a circuit&#10;&#10;Description automatically generated">
-            <a:extLst>
-              <a:ext uri="{FF2B5EF4-FFF2-40B4-BE49-F238E27FC236}">
-                <a16:creationId xmlns:a16="http://schemas.microsoft.com/office/drawing/2014/main" id="{860A57B3-B306-0B78-14A0-51F94EAA76D8}"/>
+          <p:cNvPr id="17" name="Picture 16" descr="A grid of numbers and letters&#10;&#10;Description automatically generated">
+            <a:extLst>
+              <a:ext uri="{FF2B5EF4-FFF2-40B4-BE49-F238E27FC236}">
+                <a16:creationId xmlns:a16="http://schemas.microsoft.com/office/drawing/2014/main" id="{39DA52C5-8110-3A8E-B5B8-3CB3040F5315}"/>
               </a:ext>
             </a:extLst>
           </p:cNvPr>
@@ -4566,36 +4566,6 @@
         </p:nvPicPr>
         <p:blipFill>
           <a:blip r:embed="rId5"/>
-          <a:stretch>
-            <a:fillRect/>
-          </a:stretch>
-        </p:blipFill>
-        <p:spPr>
-          <a:xfrm>
-            <a:off x="4052353" y="4595934"/>
-            <a:ext cx="1252868" cy="989584"/>
-          </a:xfrm>
-          <a:prstGeom prst="rect">
-            <a:avLst/>
-          </a:prstGeom>
-        </p:spPr>
-      </p:pic>
-      <p:pic>
-        <p:nvPicPr>
-          <p:cNvPr id="17" name="Picture 16" descr="A grid of numbers and letters&#10;&#10;Description automatically generated">
-            <a:extLst>
-              <a:ext uri="{FF2B5EF4-FFF2-40B4-BE49-F238E27FC236}">
-                <a16:creationId xmlns:a16="http://schemas.microsoft.com/office/drawing/2014/main" id="{39DA52C5-8110-3A8E-B5B8-3CB3040F5315}"/>
-              </a:ext>
-            </a:extLst>
-          </p:cNvPr>
-          <p:cNvPicPr>
-            <a:picLocks noChangeAspect="1"/>
-          </p:cNvPicPr>
-          <p:nvPr/>
-        </p:nvPicPr>
-        <p:blipFill>
-          <a:blip r:embed="rId6"/>
           <a:stretch>
             <a:fillRect/>
           </a:stretch>
@@ -4645,7 +4615,7 @@
             <p:nvPr/>
           </p:nvPicPr>
           <p:blipFill>
-            <a:blip r:embed="rId7"/>
+            <a:blip r:embed="rId6"/>
             <a:stretch>
               <a:fillRect/>
             </a:stretch>
@@ -4754,7 +4724,7 @@
           <p:nvPr/>
         </p:nvPicPr>
         <p:blipFill>
-          <a:blip r:embed="rId8"/>
+          <a:blip r:embed="rId7"/>
           <a:stretch>
             <a:fillRect/>
           </a:stretch>
@@ -4804,7 +4774,7 @@
             <p:nvPr/>
           </p:nvPicPr>
           <p:blipFill>
-            <a:blip r:embed="rId9"/>
+            <a:blip r:embed="rId8"/>
             <a:stretch>
               <a:fillRect/>
             </a:stretch>
@@ -4913,7 +4883,7 @@
           <p:nvPr/>
         </p:nvPicPr>
         <p:blipFill>
-          <a:blip r:embed="rId10"/>
+          <a:blip r:embed="rId9"/>
           <a:stretch>
             <a:fillRect/>
           </a:stretch>
@@ -4943,7 +4913,7 @@
           <p:nvPr/>
         </p:nvPicPr>
         <p:blipFill>
-          <a:blip r:embed="rId11"/>
+          <a:blip r:embed="rId10"/>
           <a:stretch>
             <a:fillRect/>
           </a:stretch>
@@ -5050,6 +5020,35 @@
           </a:p>
         </p:txBody>
       </p:sp>
+      <p:pic>
+        <p:nvPicPr>
+          <p:cNvPr id="8" name="Picture 7" descr="A diagram of a diagram&#10;&#10;Description automatically generated">
+            <a:extLst>
+              <a:ext uri="{FF2B5EF4-FFF2-40B4-BE49-F238E27FC236}">
+                <a16:creationId xmlns:a16="http://schemas.microsoft.com/office/drawing/2014/main" id="{50547B61-754A-8D4D-8979-0B02C37A628F}"/>
+              </a:ext>
+            </a:extLst>
+          </p:cNvPr>
+          <p:cNvPicPr>
+            <a:picLocks noChangeAspect="1"/>
+          </p:cNvPicPr>
+          <p:nvPr/>
+        </p:nvPicPr>
+        <p:blipFill rotWithShape="1">
+          <a:blip r:embed="rId11"/>
+          <a:srcRect r="7650"/>
+          <a:stretch/>
+        </p:blipFill>
+        <p:spPr>
+          <a:xfrm>
+            <a:off x="57152" y="2012914"/>
+            <a:ext cx="2082849" cy="3516458"/>
+          </a:xfrm>
+          <a:prstGeom prst="rect">
+            <a:avLst/>
+          </a:prstGeom>
+        </p:spPr>
+      </p:pic>
     </p:spTree>
     <p:extLst>
       <p:ext uri="{BB962C8B-B14F-4D97-AF65-F5344CB8AC3E}">

</xml_diff>